<commit_message>
GUI VERSION 1.0! Added YOPO group's Strategy, updated GUI to look nicer and work faster. Built a 'Release' version in the Release folder, which we will use to demo. Updated presentation as well.
</commit_message>
<xml_diff>
--- a/Presentation/Week10.pptx
+++ b/Presentation/Week10.pptx
@@ -1,6 +1,6 @@
 
 <file path=ppt/presentation.xml><?xml version="1.0" encoding="utf-8"?>
-<p:presentation xmlns:a="http://schemas.openxmlformats.org/drawingml/2006/main" xmlns:r="http://schemas.openxmlformats.org/officeDocument/2006/relationships" xmlns:p="http://schemas.openxmlformats.org/presentationml/2006/main" autoCompressPictures="0">
+<p:presentation xmlns:a="http://schemas.openxmlformats.org/drawingml/2006/main" xmlns:r="http://schemas.openxmlformats.org/officeDocument/2006/relationships" xmlns:p="http://schemas.openxmlformats.org/presentationml/2006/main" embedTrueTypeFonts="1" autoCompressPictures="0">
   <p:sldMasterIdLst>
     <p:sldMasterId id="2147483648" r:id="rId1"/>
   </p:sldMasterIdLst>
@@ -12,6 +12,29 @@
   </p:sldIdLst>
   <p:sldSz cx="12192000" cy="6858000"/>
   <p:notesSz cx="6858000" cy="9144000"/>
+  <p:embeddedFontLst>
+    <p:embeddedFont>
+      <p:font typeface="Roboto Condensed" panose="02000000000000000000" pitchFamily="2" charset="0"/>
+      <p:regular r:id="rId6"/>
+      <p:bold r:id="rId7"/>
+      <p:italic r:id="rId8"/>
+      <p:boldItalic r:id="rId9"/>
+    </p:embeddedFont>
+    <p:embeddedFont>
+      <p:font typeface="Segoe UI" panose="020B0502040204020203" pitchFamily="34" charset="0"/>
+      <p:regular r:id="rId10"/>
+      <p:bold r:id="rId11"/>
+      <p:italic r:id="rId12"/>
+      <p:boldItalic r:id="rId13"/>
+    </p:embeddedFont>
+    <p:embeddedFont>
+      <p:font typeface="Calibri" panose="020F0502020204030204" pitchFamily="34" charset="0"/>
+      <p:regular r:id="rId14"/>
+      <p:bold r:id="rId15"/>
+      <p:italic r:id="rId16"/>
+      <p:boldItalic r:id="rId17"/>
+    </p:embeddedFont>
+  </p:embeddedFontLst>
   <p:defaultTextStyle>
     <a:defPPr>
       <a:defRPr lang="en-US"/>
@@ -107,6 +130,11 @@
       </a:defRPr>
     </a:lvl9pPr>
   </p:defaultTextStyle>
+  <p:extLst>
+    <p:ext uri="{EFAFB233-063F-42B5-8137-9DF3F51BA10A}">
+      <p15:sldGuideLst xmlns:p15="http://schemas.microsoft.com/office/powerpoint/2012/main"/>
+    </p:ext>
+  </p:extLst>
 </p:presentation>
 </file>
 
@@ -3761,72 +3789,136 @@
             <p:ph type="ctrTitle"/>
           </p:nvPr>
         </p:nvSpPr>
-        <p:spPr/>
+        <p:spPr>
+          <a:xfrm>
+            <a:off x="3769895" y="758952"/>
+            <a:ext cx="7700209" cy="3566160"/>
+          </a:xfrm>
+        </p:spPr>
         <p:txBody>
           <a:bodyPr/>
           <a:lstStyle/>
           <a:p>
-            <a:pPr algn="ctr"/>
+            <a:pPr algn="r"/>
+            <a:r>
+              <a:rPr lang="en-SG" dirty="0" smtClean="0">
+                <a:solidFill>
+                  <a:schemeClr val="accent1"/>
+                </a:solidFill>
+                <a:cs typeface="Segoe UI" panose="020B0502040204020203" pitchFamily="34" charset="0"/>
+              </a:rPr>
+              <a:t>Fire Breathing </a:t>
+            </a:r>
+            <a:r>
+              <a:rPr lang="en-SG" dirty="0" smtClean="0">
+                <a:cs typeface="Segoe UI" panose="020B0502040204020203" pitchFamily="34" charset="0"/>
+              </a:rPr>
+              <a:t/>
+            </a:r>
+            <a:br>
+              <a:rPr lang="en-SG" dirty="0" smtClean="0">
+                <a:cs typeface="Segoe UI" panose="020B0502040204020203" pitchFamily="34" charset="0"/>
+              </a:rPr>
+            </a:br>
+            <a:r>
+              <a:rPr lang="en-SG" b="1" dirty="0" smtClean="0">
+                <a:solidFill>
+                  <a:schemeClr val="accent2"/>
+                </a:solidFill>
+                <a:cs typeface="Segoe UI" panose="020B0502040204020203" pitchFamily="34" charset="0"/>
+              </a:rPr>
+              <a:t>Rubber </a:t>
+            </a:r>
+            <a:r>
+              <a:rPr lang="en-SG" b="1" dirty="0" err="1" smtClean="0">
+                <a:solidFill>
+                  <a:schemeClr val="accent2"/>
+                </a:solidFill>
+                <a:cs typeface="Segoe UI" panose="020B0502040204020203" pitchFamily="34" charset="0"/>
+              </a:rPr>
+              <a:t>Duckies</a:t>
+            </a:r>
+            <a:endParaRPr lang="en-SG" b="1" dirty="0">
+              <a:solidFill>
+                <a:schemeClr val="accent2"/>
+              </a:solidFill>
+              <a:cs typeface="Segoe UI" panose="020B0502040204020203" pitchFamily="34" charset="0"/>
+            </a:endParaRPr>
+          </a:p>
+        </p:txBody>
+      </p:sp>
+      <p:sp>
+        <p:nvSpPr>
+          <p:cNvPr id="3" name="Subtitle 2"/>
+          <p:cNvSpPr>
+            <a:spLocks noGrp="1"/>
+          </p:cNvSpPr>
+          <p:nvPr>
+            <p:ph type="subTitle" idx="1"/>
+          </p:nvPr>
+        </p:nvSpPr>
+        <p:spPr>
+          <a:xfrm>
+            <a:off x="1411704" y="4632084"/>
+            <a:ext cx="10058400" cy="1143000"/>
+          </a:xfrm>
+        </p:spPr>
+        <p:txBody>
+          <a:bodyPr>
+            <a:normAutofit lnSpcReduction="10000"/>
+          </a:bodyPr>
+          <a:lstStyle/>
+          <a:p>
+            <a:pPr algn="r"/>
+            <a:r>
+              <a:rPr lang="en-SG" sz="4000" b="1" dirty="0" smtClean="0"/>
+              <a:t>RUBBER DUCKY TRADER</a:t>
+            </a:r>
+          </a:p>
+          <a:p>
+            <a:pPr algn="r"/>
             <a:r>
               <a:rPr lang="en-SG" dirty="0" smtClean="0"/>
-              <a:t>Fire-Breathing Rubber </a:t>
-            </a:r>
-            <a:r>
-              <a:rPr lang="en-SG" dirty="0" err="1" smtClean="0"/>
-              <a:t>Duckies</a:t>
+              <a:t>Public </a:t>
+            </a:r>
+            <a:r>
+              <a:rPr lang="en-SG" dirty="0" smtClean="0"/>
+              <a:t>Demonstration</a:t>
             </a:r>
             <a:endParaRPr lang="en-SG" dirty="0"/>
           </a:p>
         </p:txBody>
       </p:sp>
-      <p:sp>
-        <p:nvSpPr>
-          <p:cNvPr id="3" name="Subtitle 2"/>
-          <p:cNvSpPr>
-            <a:spLocks noGrp="1"/>
-          </p:cNvSpPr>
-          <p:nvPr>
-            <p:ph type="subTitle" idx="1"/>
-          </p:nvPr>
-        </p:nvSpPr>
-        <p:spPr/>
-        <p:txBody>
-          <a:bodyPr/>
-          <a:lstStyle/>
-          <a:p>
-            <a:r>
-              <a:rPr lang="en-SG" dirty="0" smtClean="0"/>
-              <a:t>Public Demonstration</a:t>
-            </a:r>
-            <a:endParaRPr lang="en-SG" dirty="0"/>
-          </a:p>
-        </p:txBody>
-      </p:sp>
-      <p:sp>
-        <p:nvSpPr>
-          <p:cNvPr id="4" name="Shape 25"/>
-          <p:cNvSpPr/>
+      <p:pic>
+        <p:nvPicPr>
+          <p:cNvPr id="5" name="Picture 4"/>
+          <p:cNvPicPr>
+            <a:picLocks noChangeAspect="1"/>
+          </p:cNvPicPr>
           <p:nvPr/>
-        </p:nvSpPr>
-        <p:spPr>
-          <a:xfrm>
-            <a:off x="4601575" y="206775"/>
-            <a:ext cx="2597716" cy="1830058"/>
+        </p:nvPicPr>
+        <p:blipFill>
+          <a:blip r:embed="rId2">
+            <a:extLst>
+              <a:ext uri="{28A0092B-C50C-407E-A947-70E740481C1C}">
+                <a14:useLocalDpi xmlns:a14="http://schemas.microsoft.com/office/drawing/2010/main" val="0"/>
+              </a:ext>
+            </a:extLst>
+          </a:blip>
+          <a:stretch>
+            <a:fillRect/>
+          </a:stretch>
+        </p:blipFill>
+        <p:spPr>
+          <a:xfrm>
+            <a:off x="290281" y="2216125"/>
+            <a:ext cx="3222941" cy="1976569"/>
           </a:xfrm>
           <a:prstGeom prst="rect">
             <a:avLst/>
           </a:prstGeom>
-          <a:blipFill>
-            <a:blip r:embed="rId2"/>
-            <a:stretch>
-              <a:fillRect/>
-            </a:stretch>
-          </a:blipFill>
-          <a:ln>
-            <a:noFill/>
-          </a:ln>
-        </p:spPr>
-      </p:sp>
+        </p:spPr>
+      </p:pic>
     </p:spTree>
     <p:extLst>
       <p:ext uri="{BB962C8B-B14F-4D97-AF65-F5344CB8AC3E}">
@@ -3871,10 +3963,15 @@
             <a:spLocks noGrp="1"/>
           </p:cNvSpPr>
           <p:nvPr>
-            <p:ph type="title"/>
-          </p:nvPr>
-        </p:nvSpPr>
-        <p:spPr/>
+            <p:ph type="title" idx="4294967295"/>
+          </p:nvPr>
+        </p:nvSpPr>
+        <p:spPr>
+          <a:xfrm>
+            <a:off x="649185" y="204211"/>
+            <a:ext cx="10058400" cy="889000"/>
+          </a:xfrm>
+        </p:spPr>
         <p:txBody>
           <a:bodyPr/>
           <a:lstStyle/>
@@ -3894,18 +3991,18 @@
             <a:spLocks noGrp="1"/>
           </p:cNvSpPr>
           <p:nvPr>
-            <p:ph idx="1"/>
-          </p:nvPr>
-        </p:nvSpPr>
-        <p:spPr>
-          <a:xfrm>
-            <a:off x="1097280" y="1845733"/>
-            <a:ext cx="10058400" cy="4606581"/>
+            <p:ph idx="4294967295"/>
+          </p:nvPr>
+        </p:nvSpPr>
+        <p:spPr>
+          <a:xfrm>
+            <a:off x="649185" y="1200088"/>
+            <a:ext cx="10058400" cy="5133975"/>
           </a:xfrm>
         </p:spPr>
         <p:txBody>
           <a:bodyPr>
-            <a:normAutofit fontScale="92500" lnSpcReduction="20000"/>
+            <a:normAutofit/>
           </a:bodyPr>
           <a:lstStyle/>
           <a:p>
@@ -4112,10 +4209,15 @@
             <a:spLocks noGrp="1"/>
           </p:cNvSpPr>
           <p:nvPr>
-            <p:ph type="title"/>
-          </p:nvPr>
-        </p:nvSpPr>
-        <p:spPr/>
+            <p:ph type="title" idx="4294967295"/>
+          </p:nvPr>
+        </p:nvSpPr>
+        <p:spPr>
+          <a:xfrm>
+            <a:off x="969818" y="239837"/>
+            <a:ext cx="10058400" cy="900112"/>
+          </a:xfrm>
+        </p:spPr>
         <p:txBody>
           <a:bodyPr/>
           <a:lstStyle/>
@@ -4135,12 +4237,19 @@
             <a:spLocks noGrp="1"/>
           </p:cNvSpPr>
           <p:nvPr>
-            <p:ph idx="1"/>
-          </p:nvPr>
-        </p:nvSpPr>
-        <p:spPr/>
-        <p:txBody>
-          <a:bodyPr/>
+            <p:ph idx="4294967295"/>
+          </p:nvPr>
+        </p:nvSpPr>
+        <p:spPr>
+          <a:xfrm>
+            <a:off x="822960" y="1246910"/>
+            <a:ext cx="5257800" cy="5031970"/>
+          </a:xfrm>
+        </p:spPr>
+        <p:txBody>
+          <a:bodyPr>
+            <a:normAutofit lnSpcReduction="10000"/>
+          </a:bodyPr>
           <a:lstStyle/>
           <a:p>
             <a:pPr>
@@ -4149,8 +4258,34 @@
             </a:pPr>
             <a:r>
               <a:rPr lang="en-SG" dirty="0" smtClean="0"/>
-              <a:t>We have chosen to use our Momentum Strategy Module, and have provided the choice to select another team’s (Actuators).</a:t>
-            </a:r>
+              <a:t>We have chosen to use our Momentum Strategy Module, </a:t>
+            </a:r>
+            <a:r>
+              <a:rPr lang="en-SG" dirty="0" smtClean="0"/>
+              <a:t>and modules from 2 other teams:</a:t>
+            </a:r>
+          </a:p>
+          <a:p>
+            <a:pPr lvl="1">
+              <a:buFont typeface="Arial" panose="020B0604020202020204" pitchFamily="34" charset="0"/>
+              <a:buChar char="•"/>
+            </a:pPr>
+            <a:r>
+              <a:rPr lang="en-SG" dirty="0" smtClean="0"/>
+              <a:t>Actuators (Group 1)</a:t>
+            </a:r>
+            <a:endParaRPr lang="en-SG" dirty="0"/>
+          </a:p>
+          <a:p>
+            <a:pPr lvl="1">
+              <a:buFont typeface="Arial" panose="020B0604020202020204" pitchFamily="34" charset="0"/>
+              <a:buChar char="•"/>
+            </a:pPr>
+            <a:r>
+              <a:rPr lang="en-SG" dirty="0" smtClean="0"/>
+              <a:t>YOPO (Group 9)</a:t>
+            </a:r>
+            <a:endParaRPr lang="en-SG" dirty="0" smtClean="0"/>
           </a:p>
           <a:p>
             <a:pPr>
@@ -4159,40 +4294,123 @@
             </a:pPr>
             <a:r>
               <a:rPr lang="en-SG" dirty="0" smtClean="0"/>
-              <a:t>Window and Threshold values are fully customisable.</a:t>
-            </a:r>
+              <a:t>Window and Threshold values are fully </a:t>
+            </a:r>
+            <a:r>
+              <a:rPr lang="en-SG" dirty="0" smtClean="0"/>
+              <a:t>customisable in the GUI, as well as Strategy</a:t>
+            </a:r>
+          </a:p>
+          <a:p>
+            <a:pPr>
+              <a:buFont typeface="Arial" panose="020B0604020202020204" pitchFamily="34" charset="0"/>
+              <a:buChar char="•"/>
+            </a:pPr>
+            <a:r>
+              <a:rPr lang="en-SG" dirty="0" smtClean="0"/>
+              <a:t>An Evaluator module performs the final evaluation stage of the process:</a:t>
+            </a:r>
+          </a:p>
+          <a:p>
+            <a:pPr lvl="1">
+              <a:buFont typeface="Arial" panose="020B0604020202020204" pitchFamily="34" charset="0"/>
+              <a:buChar char="•"/>
+            </a:pPr>
+            <a:r>
+              <a:rPr lang="en-SG" dirty="0" smtClean="0"/>
+              <a:t>Takes the Order Book as input</a:t>
+            </a:r>
+          </a:p>
+          <a:p>
+            <a:pPr lvl="1">
+              <a:buFont typeface="Arial" panose="020B0604020202020204" pitchFamily="34" charset="0"/>
+              <a:buChar char="•"/>
+            </a:pPr>
+            <a:r>
+              <a:rPr lang="en-SG" dirty="0" smtClean="0"/>
+              <a:t>Creates a text file with a list of Buy/Sell pairs</a:t>
+            </a:r>
+          </a:p>
+          <a:p>
+            <a:pPr>
+              <a:buFont typeface="Arial" panose="020B0604020202020204" pitchFamily="34" charset="0"/>
+              <a:buChar char="•"/>
+            </a:pPr>
+            <a:r>
+              <a:rPr lang="en-SG" dirty="0" smtClean="0"/>
+              <a:t>Finally, the GUI displays this in simple format</a:t>
+            </a:r>
+          </a:p>
+          <a:p>
+            <a:pPr lvl="1">
+              <a:buFont typeface="Arial" panose="020B0604020202020204" pitchFamily="34" charset="0"/>
+              <a:buChar char="•"/>
+            </a:pPr>
+            <a:r>
+              <a:rPr lang="en-SG" dirty="0" smtClean="0"/>
+              <a:t>Large sidebar with overall returns</a:t>
+            </a:r>
+          </a:p>
+          <a:p>
+            <a:pPr lvl="1">
+              <a:buFont typeface="Arial" panose="020B0604020202020204" pitchFamily="34" charset="0"/>
+              <a:buChar char="•"/>
+            </a:pPr>
+            <a:r>
+              <a:rPr lang="en-SG" dirty="0" smtClean="0"/>
+              <a:t>Buy/Sell pairs represented in table format, with in-built sorting available</a:t>
+            </a:r>
+          </a:p>
+          <a:p>
+            <a:pPr lvl="1">
+              <a:buFont typeface="Arial" panose="020B0604020202020204" pitchFamily="34" charset="0"/>
+              <a:buChar char="•"/>
+            </a:pPr>
+            <a:r>
+              <a:rPr lang="en-SG" dirty="0" smtClean="0"/>
+              <a:t>A Log tab that displays logs from each Strategy module, including </a:t>
+            </a:r>
+            <a:r>
+              <a:rPr lang="en-SG" smtClean="0"/>
+              <a:t>time taken.</a:t>
+            </a:r>
+            <a:endParaRPr lang="en-SG" dirty="0" smtClean="0"/>
+          </a:p>
+          <a:p>
+            <a:pPr>
+              <a:buFont typeface="Arial" panose="020B0604020202020204" pitchFamily="34" charset="0"/>
+              <a:buChar char="•"/>
+            </a:pPr>
             <a:endParaRPr lang="en-SG" dirty="0"/>
           </a:p>
         </p:txBody>
       </p:sp>
       <p:pic>
         <p:nvPicPr>
-          <p:cNvPr id="4" name="Picture 3"/>
+          <p:cNvPr id="6" name="Picture 5"/>
           <p:cNvPicPr>
             <a:picLocks noChangeAspect="1"/>
           </p:cNvPicPr>
           <p:nvPr/>
         </p:nvPicPr>
         <p:blipFill>
-          <a:blip r:embed="rId2">
-            <a:extLst>
-              <a:ext uri="{28A0092B-C50C-407E-A947-70E740481C1C}">
-                <a14:useLocalDpi xmlns:a14="http://schemas.microsoft.com/office/drawing/2010/main" val="0"/>
-              </a:ext>
-            </a:extLst>
-          </a:blip>
+          <a:blip r:embed="rId2"/>
           <a:stretch>
             <a:fillRect/>
           </a:stretch>
         </p:blipFill>
         <p:spPr>
           <a:xfrm>
-            <a:off x="2717443" y="3042116"/>
-            <a:ext cx="6014434" cy="3210049"/>
+            <a:off x="6263573" y="1384070"/>
+            <a:ext cx="5410267" cy="4441716"/>
           </a:xfrm>
           <a:prstGeom prst="rect">
             <a:avLst/>
           </a:prstGeom>
+          <a:noFill/>
+          <a:ln>
+            <a:noFill/>
+          </a:ln>
         </p:spPr>
       </p:pic>
     </p:spTree>
@@ -4232,73 +4450,137 @@
           <a:chExt cx="0" cy="0"/>
         </a:xfrm>
       </p:grpSpPr>
-      <p:sp>
-        <p:nvSpPr>
-          <p:cNvPr id="2" name="Title 1"/>
-          <p:cNvSpPr>
-            <a:spLocks noGrp="1"/>
-          </p:cNvSpPr>
-          <p:nvPr>
-            <p:ph type="title"/>
-          </p:nvPr>
-        </p:nvSpPr>
-        <p:spPr/>
-        <p:txBody>
-          <a:bodyPr/>
-          <a:lstStyle/>
-          <a:p>
-            <a:r>
-              <a:rPr lang="en-SG" dirty="0" smtClean="0"/>
-              <a:t>Demonstration</a:t>
-            </a:r>
-            <a:endParaRPr lang="en-SG" dirty="0"/>
-          </a:p>
-        </p:txBody>
-      </p:sp>
-      <p:sp>
-        <p:nvSpPr>
-          <p:cNvPr id="3" name="Content Placeholder 2"/>
-          <p:cNvSpPr>
-            <a:spLocks noGrp="1"/>
-          </p:cNvSpPr>
-          <p:nvPr>
-            <p:ph idx="1"/>
-          </p:nvPr>
-        </p:nvSpPr>
-        <p:spPr/>
-        <p:txBody>
-          <a:bodyPr/>
-          <a:lstStyle/>
-          <a:p>
-            <a:endParaRPr lang="en-SG" dirty="0"/>
-          </a:p>
-        </p:txBody>
-      </p:sp>
-      <p:sp>
-        <p:nvSpPr>
-          <p:cNvPr id="4" name="Shape 25"/>
-          <p:cNvSpPr/>
+      <p:pic>
+        <p:nvPicPr>
+          <p:cNvPr id="5" name="Picture 4"/>
+          <p:cNvPicPr>
+            <a:picLocks noChangeAspect="1"/>
+          </p:cNvPicPr>
           <p:nvPr/>
-        </p:nvSpPr>
-        <p:spPr>
-          <a:xfrm>
-            <a:off x="2901563" y="1834297"/>
-            <a:ext cx="5727281" cy="4034797"/>
+        </p:nvPicPr>
+        <p:blipFill>
+          <a:blip r:embed="rId2">
+            <a:extLst>
+              <a:ext uri="{28A0092B-C50C-407E-A947-70E740481C1C}">
+                <a14:useLocalDpi xmlns:a14="http://schemas.microsoft.com/office/drawing/2010/main" val="0"/>
+              </a:ext>
+            </a:extLst>
+          </a:blip>
+          <a:stretch>
+            <a:fillRect/>
+          </a:stretch>
+        </p:blipFill>
+        <p:spPr>
+          <a:xfrm>
+            <a:off x="5207190" y="-1629635"/>
+            <a:ext cx="7411530" cy="4545352"/>
           </a:xfrm>
           <a:prstGeom prst="rect">
             <a:avLst/>
           </a:prstGeom>
-          <a:blipFill>
-            <a:blip r:embed="rId2"/>
-            <a:stretch>
-              <a:fillRect/>
-            </a:stretch>
-          </a:blipFill>
-          <a:ln>
-            <a:noFill/>
-          </a:ln>
-        </p:spPr>
-      </p:sp>
+        </p:spPr>
+      </p:pic>
+      <p:sp>
+        <p:nvSpPr>
+          <p:cNvPr id="2" name="Title 1"/>
+          <p:cNvSpPr>
+            <a:spLocks noGrp="1"/>
+          </p:cNvSpPr>
+          <p:nvPr>
+            <p:ph type="title" idx="4294967295"/>
+          </p:nvPr>
+        </p:nvSpPr>
+        <p:spPr>
+          <a:xfrm>
+            <a:off x="3920213" y="173566"/>
+            <a:ext cx="4252383" cy="938951"/>
+          </a:xfrm>
+        </p:spPr>
+        <p:txBody>
+          <a:bodyPr/>
+          <a:lstStyle/>
+          <a:p>
+            <a:pPr algn="ctr"/>
+            <a:r>
+              <a:rPr lang="en-SG" dirty="0" smtClean="0"/>
+              <a:t>Demonstration</a:t>
+            </a:r>
+            <a:endParaRPr lang="en-SG" dirty="0"/>
+          </a:p>
+        </p:txBody>
+      </p:sp>
+      <p:pic>
+        <p:nvPicPr>
+          <p:cNvPr id="6" name="Picture 5"/>
+          <p:cNvPicPr>
+            <a:picLocks noChangeAspect="1"/>
+          </p:cNvPicPr>
+          <p:nvPr/>
+        </p:nvPicPr>
+        <p:blipFill>
+          <a:blip r:embed="rId3"/>
+          <a:stretch>
+            <a:fillRect/>
+          </a:stretch>
+        </p:blipFill>
+        <p:spPr>
+          <a:xfrm>
+            <a:off x="8117837" y="3053990"/>
+            <a:ext cx="3876434" cy="3182471"/>
+          </a:xfrm>
+          <a:prstGeom prst="rect">
+            <a:avLst/>
+          </a:prstGeom>
+        </p:spPr>
+      </p:pic>
+      <p:pic>
+        <p:nvPicPr>
+          <p:cNvPr id="7" name="Picture 6"/>
+          <p:cNvPicPr>
+            <a:picLocks noChangeAspect="1"/>
+          </p:cNvPicPr>
+          <p:nvPr/>
+        </p:nvPicPr>
+        <p:blipFill>
+          <a:blip r:embed="rId4"/>
+          <a:stretch>
+            <a:fillRect/>
+          </a:stretch>
+        </p:blipFill>
+        <p:spPr>
+          <a:xfrm>
+            <a:off x="4151382" y="1631327"/>
+            <a:ext cx="3876434" cy="3182471"/>
+          </a:xfrm>
+          <a:prstGeom prst="rect">
+            <a:avLst/>
+          </a:prstGeom>
+        </p:spPr>
+      </p:pic>
+      <p:pic>
+        <p:nvPicPr>
+          <p:cNvPr id="8" name="Picture 7"/>
+          <p:cNvPicPr>
+            <a:picLocks noChangeAspect="1"/>
+          </p:cNvPicPr>
+          <p:nvPr/>
+        </p:nvPicPr>
+        <p:blipFill>
+          <a:blip r:embed="rId5"/>
+          <a:stretch>
+            <a:fillRect/>
+          </a:stretch>
+        </p:blipFill>
+        <p:spPr>
+          <a:xfrm>
+            <a:off x="185119" y="3053989"/>
+            <a:ext cx="3876243" cy="3182314"/>
+          </a:xfrm>
+          <a:prstGeom prst="rect">
+            <a:avLst/>
+          </a:prstGeom>
+        </p:spPr>
+      </p:pic>
     </p:spTree>
     <p:extLst>
       <p:ext uri="{BB962C8B-B14F-4D97-AF65-F5344CB8AC3E}">
@@ -4360,76 +4642,16 @@
         <a:srgbClr val="8C8C8C"/>
       </a:folHlink>
     </a:clrScheme>
-    <a:fontScheme name="Retrospect">
+    <a:fontScheme name="NKL">
       <a:majorFont>
-        <a:latin typeface="Calibri Light" panose="020F0302020204030204"/>
+        <a:latin typeface="Roboto Condensed"/>
         <a:ea typeface=""/>
         <a:cs typeface=""/>
-        <a:font script="Jpan" typeface="ＭＳ Ｐゴシック"/>
-        <a:font script="Hang" typeface="맑은 고딕"/>
-        <a:font script="Hans" typeface="宋体"/>
-        <a:font script="Hant" typeface="新細明體"/>
-        <a:font script="Arab" typeface="Times New Roman"/>
-        <a:font script="Hebr" typeface="Times New Roman"/>
-        <a:font script="Thai" typeface="Angsana New"/>
-        <a:font script="Ethi" typeface="Nyala"/>
-        <a:font script="Beng" typeface="Vrinda"/>
-        <a:font script="Gujr" typeface="Shruti"/>
-        <a:font script="Khmr" typeface="MoolBoran"/>
-        <a:font script="Knda" typeface="Tunga"/>
-        <a:font script="Guru" typeface="Raavi"/>
-        <a:font script="Cans" typeface="Euphemia"/>
-        <a:font script="Cher" typeface="Plantagenet Cherokee"/>
-        <a:font script="Yiii" typeface="Microsoft Yi Baiti"/>
-        <a:font script="Tibt" typeface="Microsoft Himalaya"/>
-        <a:font script="Thaa" typeface="MV Boli"/>
-        <a:font script="Deva" typeface="Mangal"/>
-        <a:font script="Telu" typeface="Gautami"/>
-        <a:font script="Taml" typeface="Latha"/>
-        <a:font script="Syrc" typeface="Estrangelo Edessa"/>
-        <a:font script="Orya" typeface="Kalinga"/>
-        <a:font script="Mlym" typeface="Kartika"/>
-        <a:font script="Laoo" typeface="DokChampa"/>
-        <a:font script="Sinh" typeface="Iskoola Pota"/>
-        <a:font script="Mong" typeface="Mongolian Baiti"/>
-        <a:font script="Viet" typeface="Times New Roman"/>
-        <a:font script="Uigh" typeface="Microsoft Uighur"/>
-        <a:font script="Geor" typeface="Sylfaen"/>
       </a:majorFont>
       <a:minorFont>
-        <a:latin typeface="Calibri" panose="020F0502020204030204"/>
+        <a:latin typeface="Roboto Condensed"/>
         <a:ea typeface=""/>
         <a:cs typeface=""/>
-        <a:font script="Jpan" typeface="ＭＳ Ｐゴシック"/>
-        <a:font script="Hang" typeface="맑은 고딕"/>
-        <a:font script="Hans" typeface="宋体"/>
-        <a:font script="Hant" typeface="新細明體"/>
-        <a:font script="Arab" typeface="Arial"/>
-        <a:font script="Hebr" typeface="Arial"/>
-        <a:font script="Thai" typeface="Cordia New"/>
-        <a:font script="Ethi" typeface="Nyala"/>
-        <a:font script="Beng" typeface="Vrinda"/>
-        <a:font script="Gujr" typeface="Shruti"/>
-        <a:font script="Khmr" typeface="DaunPenh"/>
-        <a:font script="Knda" typeface="Tunga"/>
-        <a:font script="Guru" typeface="Raavi"/>
-        <a:font script="Cans" typeface="Euphemia"/>
-        <a:font script="Cher" typeface="Plantagenet Cherokee"/>
-        <a:font script="Yiii" typeface="Microsoft Yi Baiti"/>
-        <a:font script="Tibt" typeface="Microsoft Himalaya"/>
-        <a:font script="Thaa" typeface="MV Boli"/>
-        <a:font script="Deva" typeface="Mangal"/>
-        <a:font script="Telu" typeface="Gautami"/>
-        <a:font script="Taml" typeface="Latha"/>
-        <a:font script="Syrc" typeface="Estrangelo Edessa"/>
-        <a:font script="Orya" typeface="Kalinga"/>
-        <a:font script="Mlym" typeface="Kartika"/>
-        <a:font script="Laoo" typeface="DokChampa"/>
-        <a:font script="Sinh" typeface="Iskoola Pota"/>
-        <a:font script="Mong" typeface="Mongolian Baiti"/>
-        <a:font script="Viet" typeface="Arial"/>
-        <a:font script="Uigh" typeface="Microsoft Uighur"/>
-        <a:font script="Geor" typeface="Sylfaen"/>
       </a:minorFont>
     </a:fontScheme>
     <a:fmtScheme name="Retrospect">

</xml_diff>